<commit_message>
Add Page component content generation
</commit_message>
<xml_diff>
--- a/planning-and-logs/T2A-v0.002.pptx
+++ b/planning-and-logs/T2A-v0.002.pptx
@@ -5,7 +5,7 @@
     <p:sldMasterId id="2147483648" r:id="rId1"/>
   </p:sldMasterIdLst>
   <p:notesMasterIdLst>
-    <p:notesMasterId r:id="rId21"/>
+    <p:notesMasterId r:id="rId24"/>
   </p:notesMasterIdLst>
   <p:sldIdLst>
     <p:sldId id="256" r:id="rId2"/>
@@ -18,15 +18,18 @@
     <p:sldId id="260" r:id="rId9"/>
     <p:sldId id="261" r:id="rId10"/>
     <p:sldId id="272" r:id="rId11"/>
-    <p:sldId id="263" r:id="rId12"/>
-    <p:sldId id="264" r:id="rId13"/>
-    <p:sldId id="265" r:id="rId14"/>
-    <p:sldId id="266" r:id="rId15"/>
-    <p:sldId id="267" r:id="rId16"/>
-    <p:sldId id="268" r:id="rId17"/>
-    <p:sldId id="269" r:id="rId18"/>
-    <p:sldId id="270" r:id="rId19"/>
-    <p:sldId id="271" r:id="rId20"/>
+    <p:sldId id="277" r:id="rId12"/>
+    <p:sldId id="275" r:id="rId13"/>
+    <p:sldId id="276" r:id="rId14"/>
+    <p:sldId id="263" r:id="rId15"/>
+    <p:sldId id="264" r:id="rId16"/>
+    <p:sldId id="265" r:id="rId17"/>
+    <p:sldId id="266" r:id="rId18"/>
+    <p:sldId id="267" r:id="rId19"/>
+    <p:sldId id="268" r:id="rId20"/>
+    <p:sldId id="269" r:id="rId21"/>
+    <p:sldId id="270" r:id="rId22"/>
+    <p:sldId id="271" r:id="rId23"/>
   </p:sldIdLst>
   <p:sldSz cx="12192000" cy="6858000"/>
   <p:notesSz cx="6858000" cy="9144000"/>
@@ -154,8 +157,15 @@
             <p14:sldId id="272"/>
           </p14:sldIdLst>
         </p14:section>
+        <p14:section name="Xtext-debug" id="{CD5970B2-0631-4C71-BCDA-A16EA1E59813}">
+          <p14:sldIdLst>
+            <p14:sldId id="277"/>
+          </p14:sldIdLst>
+        </p14:section>
         <p14:section name="Xtend-Transformación" id="{EDBEE48E-8F12-4CB5-8933-7930C4DAAC4D}">
           <p14:sldIdLst>
+            <p14:sldId id="275"/>
+            <p14:sldId id="276"/>
             <p14:sldId id="263"/>
             <p14:sldId id="264"/>
             <p14:sldId id="265"/>
@@ -262,7 +272,7 @@
           <a:p>
             <a:fld id="{194A7CD5-1EE3-4747-97A3-E1E3716A41A1}" type="datetimeFigureOut">
               <a:rPr lang="zh-CN" altLang="en-US" smtClean="0"/>
-              <a:t>2023/2/25</a:t>
+              <a:t>2023/3/27</a:t>
             </a:fld>
             <a:endParaRPr lang="zh-CN" altLang="en-US"/>
           </a:p>
@@ -676,7 +686,7 @@
           <a:p>
             <a:fld id="{BB281D37-F1C1-421D-B41B-B00CEF0412D1}" type="datetimeFigureOut">
               <a:rPr lang="zh-CN" altLang="en-US" smtClean="0"/>
-              <a:t>2023/2/25</a:t>
+              <a:t>2023/3/27</a:t>
             </a:fld>
             <a:endParaRPr lang="zh-CN" altLang="en-US"/>
           </a:p>
@@ -874,7 +884,7 @@
           <a:p>
             <a:fld id="{BB281D37-F1C1-421D-B41B-B00CEF0412D1}" type="datetimeFigureOut">
               <a:rPr lang="zh-CN" altLang="en-US" smtClean="0"/>
-              <a:t>2023/2/25</a:t>
+              <a:t>2023/3/27</a:t>
             </a:fld>
             <a:endParaRPr lang="zh-CN" altLang="en-US"/>
           </a:p>
@@ -1082,7 +1092,7 @@
           <a:p>
             <a:fld id="{BB281D37-F1C1-421D-B41B-B00CEF0412D1}" type="datetimeFigureOut">
               <a:rPr lang="zh-CN" altLang="en-US" smtClean="0"/>
-              <a:t>2023/2/25</a:t>
+              <a:t>2023/3/27</a:t>
             </a:fld>
             <a:endParaRPr lang="zh-CN" altLang="en-US"/>
           </a:p>
@@ -1280,7 +1290,7 @@
           <a:p>
             <a:fld id="{BB281D37-F1C1-421D-B41B-B00CEF0412D1}" type="datetimeFigureOut">
               <a:rPr lang="zh-CN" altLang="en-US" smtClean="0"/>
-              <a:t>2023/2/25</a:t>
+              <a:t>2023/3/27</a:t>
             </a:fld>
             <a:endParaRPr lang="zh-CN" altLang="en-US"/>
           </a:p>
@@ -1555,7 +1565,7 @@
           <a:p>
             <a:fld id="{BB281D37-F1C1-421D-B41B-B00CEF0412D1}" type="datetimeFigureOut">
               <a:rPr lang="zh-CN" altLang="en-US" smtClean="0"/>
-              <a:t>2023/2/25</a:t>
+              <a:t>2023/3/27</a:t>
             </a:fld>
             <a:endParaRPr lang="zh-CN" altLang="en-US"/>
           </a:p>
@@ -1820,7 +1830,7 @@
           <a:p>
             <a:fld id="{BB281D37-F1C1-421D-B41B-B00CEF0412D1}" type="datetimeFigureOut">
               <a:rPr lang="zh-CN" altLang="en-US" smtClean="0"/>
-              <a:t>2023/2/25</a:t>
+              <a:t>2023/3/27</a:t>
             </a:fld>
             <a:endParaRPr lang="zh-CN" altLang="en-US"/>
           </a:p>
@@ -2232,7 +2242,7 @@
           <a:p>
             <a:fld id="{BB281D37-F1C1-421D-B41B-B00CEF0412D1}" type="datetimeFigureOut">
               <a:rPr lang="zh-CN" altLang="en-US" smtClean="0"/>
-              <a:t>2023/2/25</a:t>
+              <a:t>2023/3/27</a:t>
             </a:fld>
             <a:endParaRPr lang="zh-CN" altLang="en-US"/>
           </a:p>
@@ -2373,7 +2383,7 @@
           <a:p>
             <a:fld id="{BB281D37-F1C1-421D-B41B-B00CEF0412D1}" type="datetimeFigureOut">
               <a:rPr lang="zh-CN" altLang="en-US" smtClean="0"/>
-              <a:t>2023/2/25</a:t>
+              <a:t>2023/3/27</a:t>
             </a:fld>
             <a:endParaRPr lang="zh-CN" altLang="en-US"/>
           </a:p>
@@ -2486,7 +2496,7 @@
           <a:p>
             <a:fld id="{BB281D37-F1C1-421D-B41B-B00CEF0412D1}" type="datetimeFigureOut">
               <a:rPr lang="zh-CN" altLang="en-US" smtClean="0"/>
-              <a:t>2023/2/25</a:t>
+              <a:t>2023/3/27</a:t>
             </a:fld>
             <a:endParaRPr lang="zh-CN" altLang="en-US"/>
           </a:p>
@@ -2797,7 +2807,7 @@
           <a:p>
             <a:fld id="{BB281D37-F1C1-421D-B41B-B00CEF0412D1}" type="datetimeFigureOut">
               <a:rPr lang="zh-CN" altLang="en-US" smtClean="0"/>
-              <a:t>2023/2/25</a:t>
+              <a:t>2023/3/27</a:t>
             </a:fld>
             <a:endParaRPr lang="zh-CN" altLang="en-US"/>
           </a:p>
@@ -3085,7 +3095,7 @@
           <a:p>
             <a:fld id="{BB281D37-F1C1-421D-B41B-B00CEF0412D1}" type="datetimeFigureOut">
               <a:rPr lang="zh-CN" altLang="en-US" smtClean="0"/>
-              <a:t>2023/2/25</a:t>
+              <a:t>2023/3/27</a:t>
             </a:fld>
             <a:endParaRPr lang="zh-CN" altLang="en-US"/>
           </a:p>
@@ -3326,7 +3336,7 @@
           <a:p>
             <a:fld id="{BB281D37-F1C1-421D-B41B-B00CEF0412D1}" type="datetimeFigureOut">
               <a:rPr lang="zh-CN" altLang="en-US" smtClean="0"/>
-              <a:t>2023/2/25</a:t>
+              <a:t>2023/3/27</a:t>
             </a:fld>
             <a:endParaRPr lang="zh-CN" altLang="en-US"/>
           </a:p>
@@ -3940,6 +3950,395 @@
           <p:cNvPr id="2" name="标题 1">
             <a:extLst>
               <a:ext uri="{FF2B5EF4-FFF2-40B4-BE49-F238E27FC236}">
+                <a16:creationId xmlns:a16="http://schemas.microsoft.com/office/drawing/2014/main" id="{1F8D7C91-A081-4AEB-9430-592D94EC1770}"/>
+              </a:ext>
+            </a:extLst>
+          </p:cNvPr>
+          <p:cNvSpPr>
+            <a:spLocks noGrp="1"/>
+          </p:cNvSpPr>
+          <p:nvPr>
+            <p:ph type="title"/>
+          </p:nvPr>
+        </p:nvSpPr>
+        <p:spPr/>
+        <p:txBody>
+          <a:bodyPr/>
+          <a:lstStyle/>
+          <a:p>
+            <a:r>
+              <a:rPr lang="es-ES" altLang="zh-CN" dirty="0" err="1"/>
+              <a:t>Xtext</a:t>
+            </a:r>
+            <a:r>
+              <a:rPr lang="es-ES" altLang="zh-CN"/>
+              <a:t> - Debuging</a:t>
+            </a:r>
+            <a:endParaRPr lang="zh-CN" altLang="en-US" dirty="0"/>
+          </a:p>
+        </p:txBody>
+      </p:sp>
+      <p:sp>
+        <p:nvSpPr>
+          <p:cNvPr id="3" name="内容占位符 2">
+            <a:extLst>
+              <a:ext uri="{FF2B5EF4-FFF2-40B4-BE49-F238E27FC236}">
+                <a16:creationId xmlns:a16="http://schemas.microsoft.com/office/drawing/2014/main" id="{12E755B2-4A5E-D4FA-67D8-7EB506D9F5BD}"/>
+              </a:ext>
+            </a:extLst>
+          </p:cNvPr>
+          <p:cNvSpPr>
+            <a:spLocks noGrp="1"/>
+          </p:cNvSpPr>
+          <p:nvPr>
+            <p:ph idx="1"/>
+          </p:nvPr>
+        </p:nvSpPr>
+        <p:spPr/>
+        <p:txBody>
+          <a:bodyPr/>
+          <a:lstStyle/>
+          <a:p>
+            <a:r>
+              <a:rPr lang="en-US" altLang="zh-CN" dirty="0">
+                <a:hlinkClick r:id="rId2"/>
+              </a:rPr>
+              <a:t>Eclipse </a:t>
+            </a:r>
+            <a:r>
+              <a:rPr lang="en-US" altLang="zh-CN" dirty="0" err="1">
+                <a:hlinkClick r:id="rId2"/>
+              </a:rPr>
+              <a:t>Xtext</a:t>
+            </a:r>
+            <a:r>
+              <a:rPr lang="en-US" altLang="zh-CN" dirty="0">
+                <a:hlinkClick r:id="rId2"/>
+              </a:rPr>
+              <a:t> </a:t>
+            </a:r>
+            <a:r>
+              <a:rPr lang="en-US" altLang="zh-CN" dirty="0" err="1">
+                <a:hlinkClick r:id="rId2"/>
+              </a:rPr>
+              <a:t>Debuging</a:t>
+            </a:r>
+            <a:r>
+              <a:rPr lang="en-US" altLang="zh-CN" dirty="0">
+                <a:hlinkClick r:id="rId2"/>
+              </a:rPr>
+              <a:t>- Martin Baker (euclideanspace.com)</a:t>
+            </a:r>
+            <a:endParaRPr lang="zh-CN" altLang="en-US" dirty="0"/>
+          </a:p>
+        </p:txBody>
+      </p:sp>
+    </p:spTree>
+    <p:extLst>
+      <p:ext uri="{BB962C8B-B14F-4D97-AF65-F5344CB8AC3E}">
+        <p14:creationId xmlns:p14="http://schemas.microsoft.com/office/powerpoint/2010/main" val="3379941865"/>
+      </p:ext>
+    </p:extLst>
+  </p:cSld>
+  <p:clrMapOvr>
+    <a:masterClrMapping/>
+  </p:clrMapOvr>
+</p:sld>
+</file>
+
+<file path=ppt/slides/slide12.xml><?xml version="1.0" encoding="utf-8"?>
+<p:sld xmlns:a="http://schemas.openxmlformats.org/drawingml/2006/main" xmlns:r="http://schemas.openxmlformats.org/officeDocument/2006/relationships" xmlns:p="http://schemas.openxmlformats.org/presentationml/2006/main">
+  <p:cSld>
+    <p:spTree>
+      <p:nvGrpSpPr>
+        <p:cNvPr id="1" name=""/>
+        <p:cNvGrpSpPr/>
+        <p:nvPr/>
+      </p:nvGrpSpPr>
+      <p:grpSpPr>
+        <a:xfrm>
+          <a:off x="0" y="0"/>
+          <a:ext cx="0" cy="0"/>
+          <a:chOff x="0" y="0"/>
+          <a:chExt cx="0" cy="0"/>
+        </a:xfrm>
+      </p:grpSpPr>
+      <p:sp>
+        <p:nvSpPr>
+          <p:cNvPr id="2" name="标题 1">
+            <a:extLst>
+              <a:ext uri="{FF2B5EF4-FFF2-40B4-BE49-F238E27FC236}">
+                <a16:creationId xmlns:a16="http://schemas.microsoft.com/office/drawing/2014/main" id="{A85290F6-3A41-A74D-F35F-CF9DCC176045}"/>
+              </a:ext>
+            </a:extLst>
+          </p:cNvPr>
+          <p:cNvSpPr>
+            <a:spLocks noGrp="1"/>
+          </p:cNvSpPr>
+          <p:nvPr>
+            <p:ph type="title"/>
+          </p:nvPr>
+        </p:nvSpPr>
+        <p:spPr/>
+        <p:txBody>
+          <a:bodyPr/>
+          <a:lstStyle/>
+          <a:p>
+            <a:r>
+              <a:rPr lang="es-ES" altLang="zh-CN" dirty="0"/>
+              <a:t>Componentes con Slot - Concepto</a:t>
+            </a:r>
+            <a:endParaRPr lang="zh-CN" altLang="en-US" dirty="0"/>
+          </a:p>
+        </p:txBody>
+      </p:sp>
+      <p:sp>
+        <p:nvSpPr>
+          <p:cNvPr id="3" name="内容占位符 2">
+            <a:extLst>
+              <a:ext uri="{FF2B5EF4-FFF2-40B4-BE49-F238E27FC236}">
+                <a16:creationId xmlns:a16="http://schemas.microsoft.com/office/drawing/2014/main" id="{F4E5A1B7-482A-DDB1-5D4C-D5D6ACE91980}"/>
+              </a:ext>
+            </a:extLst>
+          </p:cNvPr>
+          <p:cNvSpPr>
+            <a:spLocks noGrp="1"/>
+          </p:cNvSpPr>
+          <p:nvPr>
+            <p:ph idx="1"/>
+          </p:nvPr>
+        </p:nvSpPr>
+        <p:spPr/>
+        <p:txBody>
+          <a:bodyPr>
+            <a:normAutofit/>
+          </a:bodyPr>
+          <a:lstStyle/>
+          <a:p>
+            <a:r>
+              <a:rPr lang="es-ES" altLang="zh-CN" dirty="0"/>
+              <a:t>Hay dos tipos de componentes </a:t>
+            </a:r>
+          </a:p>
+          <a:p>
+            <a:pPr lvl="1"/>
+            <a:r>
+              <a:rPr lang="es-ES" altLang="zh-CN" dirty="0"/>
+              <a:t>Tipo 1: el componente con slot.</a:t>
+            </a:r>
+          </a:p>
+          <a:p>
+            <a:pPr lvl="1"/>
+            <a:r>
+              <a:rPr lang="es-ES" altLang="zh-CN" dirty="0"/>
+              <a:t>Tipo 2: el componente sin slot.</a:t>
+            </a:r>
+          </a:p>
+          <a:p>
+            <a:r>
+              <a:rPr lang="es-ES" altLang="zh-CN" dirty="0"/>
+              <a:t>Comunes:</a:t>
+            </a:r>
+          </a:p>
+          <a:p>
+            <a:pPr marL="914400" lvl="1" indent="-457200">
+              <a:buFont typeface="+mj-lt"/>
+              <a:buAutoNum type="arabicPeriod"/>
+            </a:pPr>
+            <a:r>
+              <a:rPr lang="es-ES" altLang="zh-CN" dirty="0"/>
+              <a:t>los dos son reutilizables</a:t>
+            </a:r>
+          </a:p>
+          <a:p>
+            <a:r>
+              <a:rPr lang="es-ES" altLang="zh-CN" dirty="0"/>
+              <a:t>Diferencias:</a:t>
+            </a:r>
+          </a:p>
+          <a:p>
+            <a:pPr marL="914400" lvl="1" indent="-457200">
+              <a:buFont typeface="+mj-lt"/>
+              <a:buAutoNum type="arabicPeriod"/>
+            </a:pPr>
+            <a:r>
+              <a:rPr lang="es-ES" altLang="zh-CN" dirty="0"/>
+              <a:t>El tipo 1 permite poner más elementos dentro de él. Y los elementos serán renderizados por el Framework app, en nuestro caso Angular.</a:t>
+            </a:r>
+          </a:p>
+          <a:p>
+            <a:pPr marL="914400" lvl="1" indent="-457200">
+              <a:buFont typeface="+mj-lt"/>
+              <a:buAutoNum type="arabicPeriod"/>
+            </a:pPr>
+            <a:r>
+              <a:rPr lang="es-ES" altLang="zh-CN" dirty="0"/>
+              <a:t>El tipo 2 no lo permite</a:t>
+            </a:r>
+          </a:p>
+          <a:p>
+            <a:endParaRPr lang="zh-CN" altLang="en-US" dirty="0"/>
+          </a:p>
+        </p:txBody>
+      </p:sp>
+    </p:spTree>
+    <p:extLst>
+      <p:ext uri="{BB962C8B-B14F-4D97-AF65-F5344CB8AC3E}">
+        <p14:creationId xmlns:p14="http://schemas.microsoft.com/office/powerpoint/2010/main" val="757352467"/>
+      </p:ext>
+    </p:extLst>
+  </p:cSld>
+  <p:clrMapOvr>
+    <a:masterClrMapping/>
+  </p:clrMapOvr>
+</p:sld>
+</file>
+
+<file path=ppt/slides/slide13.xml><?xml version="1.0" encoding="utf-8"?>
+<p:sld xmlns:a="http://schemas.openxmlformats.org/drawingml/2006/main" xmlns:r="http://schemas.openxmlformats.org/officeDocument/2006/relationships" xmlns:p="http://schemas.openxmlformats.org/presentationml/2006/main">
+  <p:cSld>
+    <p:spTree>
+      <p:nvGrpSpPr>
+        <p:cNvPr id="1" name=""/>
+        <p:cNvGrpSpPr/>
+        <p:nvPr/>
+      </p:nvGrpSpPr>
+      <p:grpSpPr>
+        <a:xfrm>
+          <a:off x="0" y="0"/>
+          <a:ext cx="0" cy="0"/>
+          <a:chOff x="0" y="0"/>
+          <a:chExt cx="0" cy="0"/>
+        </a:xfrm>
+      </p:grpSpPr>
+      <p:sp>
+        <p:nvSpPr>
+          <p:cNvPr id="2" name="标题 1">
+            <a:extLst>
+              <a:ext uri="{FF2B5EF4-FFF2-40B4-BE49-F238E27FC236}">
+                <a16:creationId xmlns:a16="http://schemas.microsoft.com/office/drawing/2014/main" id="{0574B275-6775-E64B-9EF9-50EA50E694D3}"/>
+              </a:ext>
+            </a:extLst>
+          </p:cNvPr>
+          <p:cNvSpPr>
+            <a:spLocks noGrp="1"/>
+          </p:cNvSpPr>
+          <p:nvPr>
+            <p:ph type="title"/>
+          </p:nvPr>
+        </p:nvSpPr>
+        <p:spPr/>
+        <p:txBody>
+          <a:bodyPr/>
+          <a:lstStyle/>
+          <a:p>
+            <a:r>
+              <a:rPr lang="es-ES" altLang="zh-CN" dirty="0"/>
+              <a:t>Componentes con Slot – Representación </a:t>
+            </a:r>
+            <a:endParaRPr lang="zh-CN" altLang="en-US" dirty="0"/>
+          </a:p>
+        </p:txBody>
+      </p:sp>
+      <p:sp>
+        <p:nvSpPr>
+          <p:cNvPr id="3" name="内容占位符 2">
+            <a:extLst>
+              <a:ext uri="{FF2B5EF4-FFF2-40B4-BE49-F238E27FC236}">
+                <a16:creationId xmlns:a16="http://schemas.microsoft.com/office/drawing/2014/main" id="{C8C03F3F-FC59-E6FB-4FD9-16D9F16B6EE8}"/>
+              </a:ext>
+            </a:extLst>
+          </p:cNvPr>
+          <p:cNvSpPr>
+            <a:spLocks noGrp="1"/>
+          </p:cNvSpPr>
+          <p:nvPr>
+            <p:ph idx="1"/>
+          </p:nvPr>
+        </p:nvSpPr>
+        <p:spPr>
+          <a:xfrm>
+            <a:off x="6551628" y="1825625"/>
+            <a:ext cx="4802171" cy="4351338"/>
+          </a:xfrm>
+        </p:spPr>
+        <p:txBody>
+          <a:bodyPr/>
+          <a:lstStyle/>
+          <a:p>
+            <a:r>
+              <a:rPr lang="es-ES" altLang="zh-CN" dirty="0"/>
+              <a:t>Definición </a:t>
+            </a:r>
+            <a:endParaRPr lang="zh-CN" altLang="en-US" dirty="0"/>
+          </a:p>
+        </p:txBody>
+      </p:sp>
+      <p:pic>
+        <p:nvPicPr>
+          <p:cNvPr id="5" name="图片 4">
+            <a:extLst>
+              <a:ext uri="{FF2B5EF4-FFF2-40B4-BE49-F238E27FC236}">
+                <a16:creationId xmlns:a16="http://schemas.microsoft.com/office/drawing/2014/main" id="{86D4C47F-6B2F-C894-93F7-D8613A0EF564}"/>
+              </a:ext>
+            </a:extLst>
+          </p:cNvPr>
+          <p:cNvPicPr>
+            <a:picLocks noChangeAspect="1"/>
+          </p:cNvPicPr>
+          <p:nvPr/>
+        </p:nvPicPr>
+        <p:blipFill>
+          <a:blip r:embed="rId2"/>
+          <a:stretch>
+            <a:fillRect/>
+          </a:stretch>
+        </p:blipFill>
+        <p:spPr>
+          <a:xfrm>
+            <a:off x="838200" y="1825625"/>
+            <a:ext cx="4362450" cy="2743200"/>
+          </a:xfrm>
+          <a:prstGeom prst="rect">
+            <a:avLst/>
+          </a:prstGeom>
+        </p:spPr>
+      </p:pic>
+    </p:spTree>
+    <p:extLst>
+      <p:ext uri="{BB962C8B-B14F-4D97-AF65-F5344CB8AC3E}">
+        <p14:creationId xmlns:p14="http://schemas.microsoft.com/office/powerpoint/2010/main" val="1476251458"/>
+      </p:ext>
+    </p:extLst>
+  </p:cSld>
+  <p:clrMapOvr>
+    <a:masterClrMapping/>
+  </p:clrMapOvr>
+</p:sld>
+</file>
+
+<file path=ppt/slides/slide14.xml><?xml version="1.0" encoding="utf-8"?>
+<p:sld xmlns:a="http://schemas.openxmlformats.org/drawingml/2006/main" xmlns:r="http://schemas.openxmlformats.org/officeDocument/2006/relationships" xmlns:p="http://schemas.openxmlformats.org/presentationml/2006/main">
+  <p:cSld>
+    <p:spTree>
+      <p:nvGrpSpPr>
+        <p:cNvPr id="1" name=""/>
+        <p:cNvGrpSpPr/>
+        <p:nvPr/>
+      </p:nvGrpSpPr>
+      <p:grpSpPr>
+        <a:xfrm>
+          <a:off x="0" y="0"/>
+          <a:ext cx="0" cy="0"/>
+          <a:chOff x="0" y="0"/>
+          <a:chExt cx="0" cy="0"/>
+        </a:xfrm>
+      </p:grpSpPr>
+      <p:sp>
+        <p:nvSpPr>
+          <p:cNvPr id="2" name="标题 1">
+            <a:extLst>
+              <a:ext uri="{FF2B5EF4-FFF2-40B4-BE49-F238E27FC236}">
                 <a16:creationId xmlns:a16="http://schemas.microsoft.com/office/drawing/2014/main" id="{1C90C7C1-2A2D-AA2E-970D-7EA29D82795A}"/>
               </a:ext>
             </a:extLst>
@@ -4011,7 +4410,7 @@
 </p:sld>
 </file>
 
-<file path=ppt/slides/slide12.xml><?xml version="1.0" encoding="utf-8"?>
+<file path=ppt/slides/slide15.xml><?xml version="1.0" encoding="utf-8"?>
 <p:sld xmlns:a="http://schemas.openxmlformats.org/drawingml/2006/main" xmlns:r="http://schemas.openxmlformats.org/officeDocument/2006/relationships" xmlns:p="http://schemas.openxmlformats.org/presentationml/2006/main">
   <p:cSld>
     <p:spTree>
@@ -4129,7 +4528,7 @@
 </p:sld>
 </file>
 
-<file path=ppt/slides/slide13.xml><?xml version="1.0" encoding="utf-8"?>
+<file path=ppt/slides/slide16.xml><?xml version="1.0" encoding="utf-8"?>
 <p:sld xmlns:a="http://schemas.openxmlformats.org/drawingml/2006/main" xmlns:r="http://schemas.openxmlformats.org/officeDocument/2006/relationships" xmlns:p="http://schemas.openxmlformats.org/presentationml/2006/main">
   <p:cSld>
     <p:spTree>
@@ -4222,7 +4621,7 @@
 </p:sld>
 </file>
 
-<file path=ppt/slides/slide14.xml><?xml version="1.0" encoding="utf-8"?>
+<file path=ppt/slides/slide17.xml><?xml version="1.0" encoding="utf-8"?>
 <p:sld xmlns:a="http://schemas.openxmlformats.org/drawingml/2006/main" xmlns:r="http://schemas.openxmlformats.org/officeDocument/2006/relationships" xmlns:p="http://schemas.openxmlformats.org/presentationml/2006/main">
   <p:cSld>
     <p:spTree>
@@ -4314,7 +4713,7 @@
 </p:sld>
 </file>
 
-<file path=ppt/slides/slide15.xml><?xml version="1.0" encoding="utf-8"?>
+<file path=ppt/slides/slide18.xml><?xml version="1.0" encoding="utf-8"?>
 <p:sld xmlns:a="http://schemas.openxmlformats.org/drawingml/2006/main" xmlns:r="http://schemas.openxmlformats.org/officeDocument/2006/relationships" xmlns:p="http://schemas.openxmlformats.org/presentationml/2006/main">
   <p:cSld>
     <p:spTree>
@@ -4432,7 +4831,7 @@
 </p:sld>
 </file>
 
-<file path=ppt/slides/slide16.xml><?xml version="1.0" encoding="utf-8"?>
+<file path=ppt/slides/slide19.xml><?xml version="1.0" encoding="utf-8"?>
 <p:sld xmlns:a="http://schemas.openxmlformats.org/drawingml/2006/main" xmlns:r="http://schemas.openxmlformats.org/officeDocument/2006/relationships" xmlns:p="http://schemas.openxmlformats.org/presentationml/2006/main">
   <p:cSld>
     <p:spTree>
@@ -4605,7 +5004,475 @@
 </p:sld>
 </file>
 
-<file path=ppt/slides/slide17.xml><?xml version="1.0" encoding="utf-8"?>
+<file path=ppt/slides/slide2.xml><?xml version="1.0" encoding="utf-8"?>
+<p:sld xmlns:a="http://schemas.openxmlformats.org/drawingml/2006/main" xmlns:r="http://schemas.openxmlformats.org/officeDocument/2006/relationships" xmlns:p="http://schemas.openxmlformats.org/presentationml/2006/main">
+  <p:cSld>
+    <p:spTree>
+      <p:nvGrpSpPr>
+        <p:cNvPr id="1" name=""/>
+        <p:cNvGrpSpPr/>
+        <p:nvPr/>
+      </p:nvGrpSpPr>
+      <p:grpSpPr>
+        <a:xfrm>
+          <a:off x="0" y="0"/>
+          <a:ext cx="0" cy="0"/>
+          <a:chOff x="0" y="0"/>
+          <a:chExt cx="0" cy="0"/>
+        </a:xfrm>
+      </p:grpSpPr>
+      <p:sp>
+        <p:nvSpPr>
+          <p:cNvPr id="2" name="标题 1">
+            <a:extLst>
+              <a:ext uri="{FF2B5EF4-FFF2-40B4-BE49-F238E27FC236}">
+                <a16:creationId xmlns:a16="http://schemas.microsoft.com/office/drawing/2014/main" id="{8E963EAC-1ECD-30DB-8B50-66DA5534EAD5}"/>
+              </a:ext>
+            </a:extLst>
+          </p:cNvPr>
+          <p:cNvSpPr>
+            <a:spLocks noGrp="1"/>
+          </p:cNvSpPr>
+          <p:nvPr>
+            <p:ph type="title"/>
+          </p:nvPr>
+        </p:nvSpPr>
+        <p:spPr/>
+        <p:txBody>
+          <a:bodyPr/>
+          <a:lstStyle/>
+          <a:p>
+            <a:r>
+              <a:rPr lang="es-ES" altLang="zh-CN" dirty="0"/>
+              <a:t>La instancia deseada y los conceptos básicos</a:t>
+            </a:r>
+            <a:endParaRPr lang="zh-CN" altLang="en-US" dirty="0"/>
+          </a:p>
+        </p:txBody>
+      </p:sp>
+      <p:pic>
+        <p:nvPicPr>
+          <p:cNvPr id="5" name="内容占位符 4">
+            <a:extLst>
+              <a:ext uri="{FF2B5EF4-FFF2-40B4-BE49-F238E27FC236}">
+                <a16:creationId xmlns:a16="http://schemas.microsoft.com/office/drawing/2014/main" id="{AA6648E1-B3BA-B35F-9A6F-D6B415130EA3}"/>
+              </a:ext>
+            </a:extLst>
+          </p:cNvPr>
+          <p:cNvPicPr>
+            <a:picLocks noGrp="1" noChangeAspect="1"/>
+          </p:cNvPicPr>
+          <p:nvPr>
+            <p:ph idx="1"/>
+          </p:nvPr>
+        </p:nvPicPr>
+        <p:blipFill>
+          <a:blip r:embed="rId2"/>
+          <a:stretch>
+            <a:fillRect/>
+          </a:stretch>
+        </p:blipFill>
+        <p:spPr>
+          <a:xfrm>
+            <a:off x="1203960" y="1738322"/>
+            <a:ext cx="4184300" cy="4351338"/>
+          </a:xfrm>
+        </p:spPr>
+      </p:pic>
+      <p:sp>
+        <p:nvSpPr>
+          <p:cNvPr id="6" name="文本框 5">
+            <a:extLst>
+              <a:ext uri="{FF2B5EF4-FFF2-40B4-BE49-F238E27FC236}">
+                <a16:creationId xmlns:a16="http://schemas.microsoft.com/office/drawing/2014/main" id="{F9255AD5-579D-E74C-8843-691E8D7D41FD}"/>
+              </a:ext>
+            </a:extLst>
+          </p:cNvPr>
+          <p:cNvSpPr txBox="1"/>
+          <p:nvPr/>
+        </p:nvSpPr>
+        <p:spPr>
+          <a:xfrm>
+            <a:off x="6289040" y="1467168"/>
+            <a:ext cx="4546600" cy="4893647"/>
+          </a:xfrm>
+          <a:prstGeom prst="rect">
+            <a:avLst/>
+          </a:prstGeom>
+          <a:noFill/>
+        </p:spPr>
+        <p:txBody>
+          <a:bodyPr wrap="square" rtlCol="0">
+            <a:spAutoFit/>
+          </a:bodyPr>
+          <a:lstStyle/>
+          <a:p>
+            <a:pPr algn="ctr"/>
+            <a:r>
+              <a:rPr lang="en-US" altLang="zh-CN" sz="2400" b="1" dirty="0" err="1"/>
+              <a:t>Conceptos</a:t>
+            </a:r>
+            <a:r>
+              <a:rPr lang="en-US" altLang="zh-CN" b="1" dirty="0"/>
+              <a:t> </a:t>
+            </a:r>
+            <a:r>
+              <a:rPr lang="en-US" altLang="zh-CN" sz="2400" b="1" dirty="0" err="1"/>
+              <a:t>básicos</a:t>
+            </a:r>
+            <a:r>
+              <a:rPr lang="en-US" altLang="zh-CN" b="1" dirty="0"/>
+              <a:t>:</a:t>
+            </a:r>
+          </a:p>
+          <a:p>
+            <a:endParaRPr lang="en-US" altLang="zh-CN" b="1" dirty="0"/>
+          </a:p>
+          <a:p>
+            <a:r>
+              <a:rPr lang="en-US" altLang="zh-CN" b="1" dirty="0"/>
+              <a:t>Dom</a:t>
+            </a:r>
+            <a:r>
+              <a:rPr lang="en-US" altLang="zh-CN" dirty="0"/>
+              <a:t>: es para </a:t>
+            </a:r>
+            <a:r>
+              <a:rPr lang="en-US" altLang="zh-CN" dirty="0" err="1"/>
+              <a:t>dar</a:t>
+            </a:r>
+            <a:r>
+              <a:rPr lang="en-US" altLang="zh-CN" dirty="0"/>
+              <a:t> al </a:t>
+            </a:r>
+            <a:r>
+              <a:rPr lang="en-US" altLang="zh-CN" dirty="0" err="1"/>
+              <a:t>metamodelo</a:t>
+            </a:r>
+            <a:r>
+              <a:rPr lang="en-US" altLang="zh-CN" dirty="0"/>
+              <a:t> la</a:t>
+            </a:r>
+            <a:r>
+              <a:rPr lang="zh-CN" altLang="en-US" dirty="0"/>
+              <a:t> </a:t>
+            </a:r>
+            <a:r>
+              <a:rPr lang="en-US" altLang="zh-CN" dirty="0" err="1"/>
+              <a:t>habilidad</a:t>
+            </a:r>
+            <a:r>
+              <a:rPr lang="en-US" altLang="zh-CN" dirty="0"/>
+              <a:t> de </a:t>
+            </a:r>
+            <a:r>
+              <a:rPr lang="en-US" altLang="zh-CN" dirty="0" err="1"/>
+              <a:t>definir</a:t>
+            </a:r>
+            <a:r>
+              <a:rPr lang="en-US" altLang="zh-CN" dirty="0"/>
+              <a:t> </a:t>
+            </a:r>
+            <a:r>
+              <a:rPr lang="en-US" altLang="zh-CN" dirty="0" err="1"/>
+              <a:t>los</a:t>
+            </a:r>
+            <a:r>
+              <a:rPr lang="en-US" altLang="zh-CN" dirty="0"/>
+              <a:t> DOMs </a:t>
+            </a:r>
+            <a:r>
+              <a:rPr lang="en-US" altLang="zh-CN" dirty="0" err="1"/>
+              <a:t>existentes</a:t>
+            </a:r>
+            <a:r>
+              <a:rPr lang="en-US" altLang="zh-CN" dirty="0"/>
+              <a:t> </a:t>
+            </a:r>
+            <a:r>
+              <a:rPr lang="en-US" altLang="zh-CN" dirty="0" err="1"/>
+              <a:t>en</a:t>
+            </a:r>
+            <a:r>
+              <a:rPr lang="en-US" altLang="zh-CN" dirty="0"/>
+              <a:t> </a:t>
+            </a:r>
+            <a:r>
+              <a:rPr lang="en-US" altLang="zh-CN" dirty="0" err="1"/>
+              <a:t>el</a:t>
+            </a:r>
+            <a:r>
+              <a:rPr lang="en-US" altLang="zh-CN" dirty="0"/>
+              <a:t> </a:t>
+            </a:r>
+            <a:r>
+              <a:rPr lang="en-US" altLang="zh-CN" dirty="0" err="1"/>
+              <a:t>est</a:t>
+            </a:r>
+            <a:r>
+              <a:rPr lang="es-ES" altLang="zh-CN" dirty="0" err="1"/>
+              <a:t>ándar</a:t>
+            </a:r>
+            <a:r>
+              <a:rPr lang="es-ES" altLang="zh-CN" dirty="0"/>
+              <a:t> de HTML. Se usa simplemente insertando en el sitio del fichero comp.html</a:t>
+            </a:r>
+          </a:p>
+          <a:p>
+            <a:endParaRPr lang="es-ES" altLang="zh-CN" dirty="0"/>
+          </a:p>
+          <a:p>
+            <a:r>
+              <a:rPr lang="es-ES" altLang="zh-CN" b="1" dirty="0" err="1"/>
+              <a:t>Comp</a:t>
+            </a:r>
+            <a:r>
+              <a:rPr lang="en-US" altLang="zh-CN" dirty="0"/>
+              <a:t>: es para </a:t>
+            </a:r>
+            <a:r>
+              <a:rPr lang="en-US" altLang="zh-CN" dirty="0" err="1"/>
+              <a:t>definir</a:t>
+            </a:r>
+            <a:r>
+              <a:rPr lang="en-US" altLang="zh-CN" dirty="0"/>
+              <a:t> un </a:t>
+            </a:r>
+            <a:r>
+              <a:rPr lang="en-US" altLang="zh-CN" dirty="0" err="1"/>
+              <a:t>componente</a:t>
+            </a:r>
+            <a:r>
+              <a:rPr lang="en-US" altLang="zh-CN" dirty="0"/>
+              <a:t> Angular y se </a:t>
+            </a:r>
+            <a:r>
+              <a:rPr lang="en-US" altLang="zh-CN" dirty="0" err="1"/>
+              <a:t>creará</a:t>
+            </a:r>
+            <a:r>
+              <a:rPr lang="en-US" altLang="zh-CN" dirty="0"/>
+              <a:t> </a:t>
+            </a:r>
+            <a:r>
+              <a:rPr lang="en-US" altLang="zh-CN" dirty="0" err="1"/>
+              <a:t>unos</a:t>
+            </a:r>
+            <a:r>
+              <a:rPr lang="en-US" altLang="zh-CN" dirty="0"/>
+              <a:t> </a:t>
+            </a:r>
+            <a:r>
+              <a:rPr lang="en-US" altLang="zh-CN" dirty="0" err="1"/>
+              <a:t>ficheros</a:t>
+            </a:r>
+            <a:r>
+              <a:rPr lang="en-US" altLang="zh-CN" dirty="0"/>
+              <a:t> </a:t>
+            </a:r>
+            <a:r>
+              <a:rPr lang="en-US" altLang="zh-CN" dirty="0" err="1"/>
+              <a:t>como</a:t>
+            </a:r>
+            <a:r>
+              <a:rPr lang="en-US" altLang="zh-CN" dirty="0"/>
+              <a:t> </a:t>
+            </a:r>
+            <a:r>
+              <a:rPr lang="en-US" altLang="zh-CN" dirty="0" err="1"/>
+              <a:t>nombreComp.comp.ts</a:t>
+            </a:r>
+            <a:r>
+              <a:rPr lang="en-US" altLang="zh-CN" dirty="0"/>
+              <a:t>, nombreComp.html y la </a:t>
+            </a:r>
+            <a:r>
+              <a:rPr lang="en-US" altLang="zh-CN" dirty="0" err="1"/>
+              <a:t>definición</a:t>
+            </a:r>
+            <a:r>
+              <a:rPr lang="en-US" altLang="zh-CN" dirty="0"/>
+              <a:t> </a:t>
+            </a:r>
+            <a:r>
+              <a:rPr lang="en-US" altLang="zh-CN" dirty="0" err="1"/>
+              <a:t>descrita</a:t>
+            </a:r>
+            <a:r>
+              <a:rPr lang="en-US" altLang="zh-CN" dirty="0"/>
+              <a:t> </a:t>
+            </a:r>
+            <a:r>
+              <a:rPr lang="en-US" altLang="zh-CN" dirty="0" err="1"/>
+              <a:t>en</a:t>
+            </a:r>
+            <a:r>
+              <a:rPr lang="en-US" altLang="zh-CN" dirty="0"/>
+              <a:t> </a:t>
+            </a:r>
+            <a:r>
+              <a:rPr lang="en-US" altLang="zh-CN" dirty="0" err="1"/>
+              <a:t>el</a:t>
+            </a:r>
+            <a:r>
+              <a:rPr lang="en-US" altLang="zh-CN" dirty="0"/>
+              <a:t> Comp </a:t>
+            </a:r>
+            <a:r>
+              <a:rPr lang="en-US" altLang="zh-CN" dirty="0" err="1"/>
+              <a:t>será</a:t>
+            </a:r>
+            <a:r>
+              <a:rPr lang="en-US" altLang="zh-CN" dirty="0"/>
+              <a:t> </a:t>
+            </a:r>
+            <a:r>
+              <a:rPr lang="en-US" altLang="zh-CN" dirty="0" err="1"/>
+              <a:t>insertado</a:t>
+            </a:r>
+            <a:r>
+              <a:rPr lang="en-US" altLang="zh-CN" dirty="0"/>
+              <a:t> </a:t>
+            </a:r>
+            <a:r>
+              <a:rPr lang="en-US" altLang="zh-CN" dirty="0" err="1"/>
+              <a:t>en</a:t>
+            </a:r>
+            <a:r>
+              <a:rPr lang="en-US" altLang="zh-CN" dirty="0"/>
+              <a:t> </a:t>
+            </a:r>
+            <a:r>
+              <a:rPr lang="en-US" altLang="zh-CN" dirty="0" err="1"/>
+              <a:t>el</a:t>
+            </a:r>
+            <a:r>
+              <a:rPr lang="en-US" altLang="zh-CN" dirty="0"/>
+              <a:t> </a:t>
+            </a:r>
+            <a:r>
+              <a:rPr lang="en-US" altLang="zh-CN" dirty="0" err="1"/>
+              <a:t>fichero</a:t>
+            </a:r>
+            <a:r>
+              <a:rPr lang="en-US" altLang="zh-CN" dirty="0"/>
+              <a:t> </a:t>
+            </a:r>
+            <a:r>
+              <a:rPr lang="en-US" altLang="zh-CN" dirty="0" err="1"/>
+              <a:t>comp.ts</a:t>
+            </a:r>
+            <a:r>
+              <a:rPr lang="en-US" altLang="zh-CN" dirty="0"/>
+              <a:t> y fichero.html. </a:t>
+            </a:r>
+            <a:r>
+              <a:rPr lang="en-US" altLang="zh-CN" dirty="0" err="1"/>
+              <a:t>Adem</a:t>
+            </a:r>
+            <a:r>
+              <a:rPr lang="es-ES" altLang="zh-CN" dirty="0" err="1"/>
+              <a:t>ás</a:t>
+            </a:r>
+            <a:r>
+              <a:rPr lang="es-ES" altLang="zh-CN" dirty="0"/>
+              <a:t> los </a:t>
+            </a:r>
+            <a:r>
+              <a:rPr lang="es-ES" altLang="zh-CN" dirty="0" err="1"/>
+              <a:t>comps</a:t>
+            </a:r>
+            <a:r>
+              <a:rPr lang="es-ES" altLang="zh-CN" dirty="0"/>
+              <a:t> se pueden reutilizar en las páginas como </a:t>
+            </a:r>
+            <a:r>
+              <a:rPr lang="es-ES" altLang="zh-CN" dirty="0" err="1"/>
+              <a:t>DOMs</a:t>
+            </a:r>
+            <a:r>
+              <a:rPr lang="es-ES" altLang="zh-CN" dirty="0"/>
+              <a:t>.</a:t>
+            </a:r>
+            <a:endParaRPr lang="en-US" altLang="zh-CN" dirty="0"/>
+          </a:p>
+          <a:p>
+            <a:endParaRPr lang="en-US" altLang="zh-CN" dirty="0"/>
+          </a:p>
+          <a:p>
+            <a:r>
+              <a:rPr lang="en-US" altLang="zh-CN" b="1" dirty="0"/>
+              <a:t>Page</a:t>
+            </a:r>
+            <a:r>
+              <a:rPr lang="en-US" altLang="zh-CN" dirty="0"/>
+              <a:t>: es </a:t>
+            </a:r>
+            <a:r>
+              <a:rPr lang="en-US" altLang="zh-CN" dirty="0" err="1"/>
+              <a:t>como</a:t>
+            </a:r>
+            <a:r>
+              <a:rPr lang="en-US" altLang="zh-CN" dirty="0"/>
+              <a:t> Comp </a:t>
+            </a:r>
+            <a:r>
+              <a:rPr lang="en-US" altLang="zh-CN" dirty="0" err="1"/>
+              <a:t>pero</a:t>
+            </a:r>
+            <a:r>
+              <a:rPr lang="en-US" altLang="zh-CN" dirty="0"/>
+              <a:t> no es </a:t>
+            </a:r>
+            <a:r>
+              <a:rPr lang="en-US" altLang="zh-CN" dirty="0" err="1"/>
+              <a:t>reutilizable</a:t>
+            </a:r>
+            <a:r>
+              <a:rPr lang="en-US" altLang="zh-CN" dirty="0"/>
+              <a:t> </a:t>
+            </a:r>
+            <a:r>
+              <a:rPr lang="en-US" altLang="zh-CN" dirty="0" err="1"/>
+              <a:t>en</a:t>
+            </a:r>
+            <a:r>
+              <a:rPr lang="en-US" altLang="zh-CN" dirty="0"/>
+              <a:t> DOMs, </a:t>
+            </a:r>
+            <a:r>
+              <a:rPr lang="en-US" altLang="zh-CN" dirty="0" err="1"/>
+              <a:t>ni</a:t>
+            </a:r>
+            <a:r>
+              <a:rPr lang="en-US" altLang="zh-CN" dirty="0"/>
+              <a:t> COMPs </a:t>
+            </a:r>
+            <a:r>
+              <a:rPr lang="en-US" altLang="zh-CN" dirty="0" err="1"/>
+              <a:t>ni</a:t>
+            </a:r>
+            <a:r>
+              <a:rPr lang="en-US" altLang="zh-CN" dirty="0"/>
+              <a:t> Pages.</a:t>
+            </a:r>
+          </a:p>
+        </p:txBody>
+      </p:sp>
+    </p:spTree>
+    <p:extLst>
+      <p:ext uri="{BB962C8B-B14F-4D97-AF65-F5344CB8AC3E}">
+        <p14:creationId xmlns:p14="http://schemas.microsoft.com/office/powerpoint/2010/main" val="3884676035"/>
+      </p:ext>
+    </p:extLst>
+  </p:cSld>
+  <p:clrMapOvr>
+    <a:masterClrMapping/>
+  </p:clrMapOvr>
+</p:sld>
+</file>
+
+<file path=ppt/slides/slide20.xml><?xml version="1.0" encoding="utf-8"?>
 <p:sld xmlns:a="http://schemas.openxmlformats.org/drawingml/2006/main" xmlns:r="http://schemas.openxmlformats.org/officeDocument/2006/relationships" xmlns:p="http://schemas.openxmlformats.org/presentationml/2006/main">
   <p:cSld>
     <p:spTree>
@@ -4724,7 +5591,7 @@
 </p:sld>
 </file>
 
-<file path=ppt/slides/slide18.xml><?xml version="1.0" encoding="utf-8"?>
+<file path=ppt/slides/slide21.xml><?xml version="1.0" encoding="utf-8"?>
 <p:sld xmlns:a="http://schemas.openxmlformats.org/drawingml/2006/main" xmlns:r="http://schemas.openxmlformats.org/officeDocument/2006/relationships" xmlns:p="http://schemas.openxmlformats.org/presentationml/2006/main">
   <p:cSld>
     <p:spTree>
@@ -4843,7 +5710,7 @@
 </p:sld>
 </file>
 
-<file path=ppt/slides/slide19.xml><?xml version="1.0" encoding="utf-8"?>
+<file path=ppt/slides/slide22.xml><?xml version="1.0" encoding="utf-8"?>
 <p:sld xmlns:a="http://schemas.openxmlformats.org/drawingml/2006/main" xmlns:r="http://schemas.openxmlformats.org/officeDocument/2006/relationships" xmlns:p="http://schemas.openxmlformats.org/presentationml/2006/main">
   <p:cSld>
     <p:spTree>
@@ -4962,8 +5829,8 @@
         </p:blipFill>
         <p:spPr>
           <a:xfrm>
-            <a:off x="949961" y="3429000"/>
-            <a:ext cx="6315742" cy="2108200"/>
+            <a:off x="700812" y="3429000"/>
+            <a:ext cx="5007779" cy="1671601"/>
           </a:xfrm>
           <a:prstGeom prst="rect">
             <a:avLst/>
@@ -5013,474 +5880,6 @@
 </p:sld>
 </file>
 
-<file path=ppt/slides/slide2.xml><?xml version="1.0" encoding="utf-8"?>
-<p:sld xmlns:a="http://schemas.openxmlformats.org/drawingml/2006/main" xmlns:r="http://schemas.openxmlformats.org/officeDocument/2006/relationships" xmlns:p="http://schemas.openxmlformats.org/presentationml/2006/main">
-  <p:cSld>
-    <p:spTree>
-      <p:nvGrpSpPr>
-        <p:cNvPr id="1" name=""/>
-        <p:cNvGrpSpPr/>
-        <p:nvPr/>
-      </p:nvGrpSpPr>
-      <p:grpSpPr>
-        <a:xfrm>
-          <a:off x="0" y="0"/>
-          <a:ext cx="0" cy="0"/>
-          <a:chOff x="0" y="0"/>
-          <a:chExt cx="0" cy="0"/>
-        </a:xfrm>
-      </p:grpSpPr>
-      <p:sp>
-        <p:nvSpPr>
-          <p:cNvPr id="2" name="标题 1">
-            <a:extLst>
-              <a:ext uri="{FF2B5EF4-FFF2-40B4-BE49-F238E27FC236}">
-                <a16:creationId xmlns:a16="http://schemas.microsoft.com/office/drawing/2014/main" id="{8E963EAC-1ECD-30DB-8B50-66DA5534EAD5}"/>
-              </a:ext>
-            </a:extLst>
-          </p:cNvPr>
-          <p:cNvSpPr>
-            <a:spLocks noGrp="1"/>
-          </p:cNvSpPr>
-          <p:nvPr>
-            <p:ph type="title"/>
-          </p:nvPr>
-        </p:nvSpPr>
-        <p:spPr/>
-        <p:txBody>
-          <a:bodyPr/>
-          <a:lstStyle/>
-          <a:p>
-            <a:r>
-              <a:rPr lang="es-ES" altLang="zh-CN" dirty="0"/>
-              <a:t>La instancia deseada y los conceptos básicos</a:t>
-            </a:r>
-            <a:endParaRPr lang="zh-CN" altLang="en-US" dirty="0"/>
-          </a:p>
-        </p:txBody>
-      </p:sp>
-      <p:pic>
-        <p:nvPicPr>
-          <p:cNvPr id="5" name="内容占位符 4">
-            <a:extLst>
-              <a:ext uri="{FF2B5EF4-FFF2-40B4-BE49-F238E27FC236}">
-                <a16:creationId xmlns:a16="http://schemas.microsoft.com/office/drawing/2014/main" id="{AA6648E1-B3BA-B35F-9A6F-D6B415130EA3}"/>
-              </a:ext>
-            </a:extLst>
-          </p:cNvPr>
-          <p:cNvPicPr>
-            <a:picLocks noGrp="1" noChangeAspect="1"/>
-          </p:cNvPicPr>
-          <p:nvPr>
-            <p:ph idx="1"/>
-          </p:nvPr>
-        </p:nvPicPr>
-        <p:blipFill>
-          <a:blip r:embed="rId2"/>
-          <a:stretch>
-            <a:fillRect/>
-          </a:stretch>
-        </p:blipFill>
-        <p:spPr>
-          <a:xfrm>
-            <a:off x="1203960" y="1738322"/>
-            <a:ext cx="4184300" cy="4351338"/>
-          </a:xfrm>
-        </p:spPr>
-      </p:pic>
-      <p:sp>
-        <p:nvSpPr>
-          <p:cNvPr id="6" name="文本框 5">
-            <a:extLst>
-              <a:ext uri="{FF2B5EF4-FFF2-40B4-BE49-F238E27FC236}">
-                <a16:creationId xmlns:a16="http://schemas.microsoft.com/office/drawing/2014/main" id="{F9255AD5-579D-E74C-8843-691E8D7D41FD}"/>
-              </a:ext>
-            </a:extLst>
-          </p:cNvPr>
-          <p:cNvSpPr txBox="1"/>
-          <p:nvPr/>
-        </p:nvSpPr>
-        <p:spPr>
-          <a:xfrm>
-            <a:off x="6289040" y="1467168"/>
-            <a:ext cx="4546600" cy="4893647"/>
-          </a:xfrm>
-          <a:prstGeom prst="rect">
-            <a:avLst/>
-          </a:prstGeom>
-          <a:noFill/>
-        </p:spPr>
-        <p:txBody>
-          <a:bodyPr wrap="square" rtlCol="0">
-            <a:spAutoFit/>
-          </a:bodyPr>
-          <a:lstStyle/>
-          <a:p>
-            <a:pPr algn="ctr"/>
-            <a:r>
-              <a:rPr lang="en-US" altLang="zh-CN" sz="2400" b="1" dirty="0" err="1"/>
-              <a:t>Conceptos</a:t>
-            </a:r>
-            <a:r>
-              <a:rPr lang="en-US" altLang="zh-CN" b="1" dirty="0"/>
-              <a:t> </a:t>
-            </a:r>
-            <a:r>
-              <a:rPr lang="en-US" altLang="zh-CN" sz="2400" b="1" dirty="0" err="1"/>
-              <a:t>básicos</a:t>
-            </a:r>
-            <a:r>
-              <a:rPr lang="en-US" altLang="zh-CN" b="1" dirty="0"/>
-              <a:t>:</a:t>
-            </a:r>
-          </a:p>
-          <a:p>
-            <a:endParaRPr lang="en-US" altLang="zh-CN" b="1" dirty="0"/>
-          </a:p>
-          <a:p>
-            <a:r>
-              <a:rPr lang="en-US" altLang="zh-CN" b="1" dirty="0"/>
-              <a:t>Dom</a:t>
-            </a:r>
-            <a:r>
-              <a:rPr lang="en-US" altLang="zh-CN" dirty="0"/>
-              <a:t>: es para </a:t>
-            </a:r>
-            <a:r>
-              <a:rPr lang="en-US" altLang="zh-CN" dirty="0" err="1"/>
-              <a:t>dar</a:t>
-            </a:r>
-            <a:r>
-              <a:rPr lang="en-US" altLang="zh-CN" dirty="0"/>
-              <a:t> al </a:t>
-            </a:r>
-            <a:r>
-              <a:rPr lang="en-US" altLang="zh-CN" dirty="0" err="1"/>
-              <a:t>metamodelo</a:t>
-            </a:r>
-            <a:r>
-              <a:rPr lang="en-US" altLang="zh-CN" dirty="0"/>
-              <a:t> la</a:t>
-            </a:r>
-            <a:r>
-              <a:rPr lang="zh-CN" altLang="en-US" dirty="0"/>
-              <a:t> </a:t>
-            </a:r>
-            <a:r>
-              <a:rPr lang="en-US" altLang="zh-CN" dirty="0" err="1"/>
-              <a:t>habilidad</a:t>
-            </a:r>
-            <a:r>
-              <a:rPr lang="en-US" altLang="zh-CN" dirty="0"/>
-              <a:t> de </a:t>
-            </a:r>
-            <a:r>
-              <a:rPr lang="en-US" altLang="zh-CN" dirty="0" err="1"/>
-              <a:t>definir</a:t>
-            </a:r>
-            <a:r>
-              <a:rPr lang="en-US" altLang="zh-CN" dirty="0"/>
-              <a:t> </a:t>
-            </a:r>
-            <a:r>
-              <a:rPr lang="en-US" altLang="zh-CN" dirty="0" err="1"/>
-              <a:t>los</a:t>
-            </a:r>
-            <a:r>
-              <a:rPr lang="en-US" altLang="zh-CN" dirty="0"/>
-              <a:t> DOMs </a:t>
-            </a:r>
-            <a:r>
-              <a:rPr lang="en-US" altLang="zh-CN" dirty="0" err="1"/>
-              <a:t>existentes</a:t>
-            </a:r>
-            <a:r>
-              <a:rPr lang="en-US" altLang="zh-CN" dirty="0"/>
-              <a:t> </a:t>
-            </a:r>
-            <a:r>
-              <a:rPr lang="en-US" altLang="zh-CN" dirty="0" err="1"/>
-              <a:t>en</a:t>
-            </a:r>
-            <a:r>
-              <a:rPr lang="en-US" altLang="zh-CN" dirty="0"/>
-              <a:t> </a:t>
-            </a:r>
-            <a:r>
-              <a:rPr lang="en-US" altLang="zh-CN" dirty="0" err="1"/>
-              <a:t>el</a:t>
-            </a:r>
-            <a:r>
-              <a:rPr lang="en-US" altLang="zh-CN" dirty="0"/>
-              <a:t> </a:t>
-            </a:r>
-            <a:r>
-              <a:rPr lang="en-US" altLang="zh-CN" dirty="0" err="1"/>
-              <a:t>est</a:t>
-            </a:r>
-            <a:r>
-              <a:rPr lang="es-ES" altLang="zh-CN" dirty="0" err="1"/>
-              <a:t>ándar</a:t>
-            </a:r>
-            <a:r>
-              <a:rPr lang="es-ES" altLang="zh-CN" dirty="0"/>
-              <a:t> de HTML. Se usa simplemente insertando en el sitio del fichero comp.html</a:t>
-            </a:r>
-          </a:p>
-          <a:p>
-            <a:endParaRPr lang="es-ES" altLang="zh-CN" dirty="0"/>
-          </a:p>
-          <a:p>
-            <a:r>
-              <a:rPr lang="es-ES" altLang="zh-CN" b="1" dirty="0" err="1"/>
-              <a:t>Comp</a:t>
-            </a:r>
-            <a:r>
-              <a:rPr lang="en-US" altLang="zh-CN" dirty="0"/>
-              <a:t>: es para </a:t>
-            </a:r>
-            <a:r>
-              <a:rPr lang="en-US" altLang="zh-CN" dirty="0" err="1"/>
-              <a:t>definir</a:t>
-            </a:r>
-            <a:r>
-              <a:rPr lang="en-US" altLang="zh-CN" dirty="0"/>
-              <a:t> un </a:t>
-            </a:r>
-            <a:r>
-              <a:rPr lang="en-US" altLang="zh-CN" dirty="0" err="1"/>
-              <a:t>componente</a:t>
-            </a:r>
-            <a:r>
-              <a:rPr lang="en-US" altLang="zh-CN" dirty="0"/>
-              <a:t> Angular y se </a:t>
-            </a:r>
-            <a:r>
-              <a:rPr lang="en-US" altLang="zh-CN" dirty="0" err="1"/>
-              <a:t>creará</a:t>
-            </a:r>
-            <a:r>
-              <a:rPr lang="en-US" altLang="zh-CN" dirty="0"/>
-              <a:t> </a:t>
-            </a:r>
-            <a:r>
-              <a:rPr lang="en-US" altLang="zh-CN" dirty="0" err="1"/>
-              <a:t>unos</a:t>
-            </a:r>
-            <a:r>
-              <a:rPr lang="en-US" altLang="zh-CN" dirty="0"/>
-              <a:t> </a:t>
-            </a:r>
-            <a:r>
-              <a:rPr lang="en-US" altLang="zh-CN" dirty="0" err="1"/>
-              <a:t>ficheros</a:t>
-            </a:r>
-            <a:r>
-              <a:rPr lang="en-US" altLang="zh-CN" dirty="0"/>
-              <a:t> </a:t>
-            </a:r>
-            <a:r>
-              <a:rPr lang="en-US" altLang="zh-CN" dirty="0" err="1"/>
-              <a:t>como</a:t>
-            </a:r>
-            <a:r>
-              <a:rPr lang="en-US" altLang="zh-CN" dirty="0"/>
-              <a:t> </a:t>
-            </a:r>
-            <a:r>
-              <a:rPr lang="en-US" altLang="zh-CN" dirty="0" err="1"/>
-              <a:t>nombreComp.comp.ts</a:t>
-            </a:r>
-            <a:r>
-              <a:rPr lang="en-US" altLang="zh-CN" dirty="0"/>
-              <a:t>, nombreComp.html y la </a:t>
-            </a:r>
-            <a:r>
-              <a:rPr lang="en-US" altLang="zh-CN" dirty="0" err="1"/>
-              <a:t>definición</a:t>
-            </a:r>
-            <a:r>
-              <a:rPr lang="en-US" altLang="zh-CN" dirty="0"/>
-              <a:t> </a:t>
-            </a:r>
-            <a:r>
-              <a:rPr lang="en-US" altLang="zh-CN" dirty="0" err="1"/>
-              <a:t>descrita</a:t>
-            </a:r>
-            <a:r>
-              <a:rPr lang="en-US" altLang="zh-CN" dirty="0"/>
-              <a:t> </a:t>
-            </a:r>
-            <a:r>
-              <a:rPr lang="en-US" altLang="zh-CN" dirty="0" err="1"/>
-              <a:t>en</a:t>
-            </a:r>
-            <a:r>
-              <a:rPr lang="en-US" altLang="zh-CN" dirty="0"/>
-              <a:t> </a:t>
-            </a:r>
-            <a:r>
-              <a:rPr lang="en-US" altLang="zh-CN" dirty="0" err="1"/>
-              <a:t>el</a:t>
-            </a:r>
-            <a:r>
-              <a:rPr lang="en-US" altLang="zh-CN" dirty="0"/>
-              <a:t> Comp </a:t>
-            </a:r>
-            <a:r>
-              <a:rPr lang="en-US" altLang="zh-CN" dirty="0" err="1"/>
-              <a:t>será</a:t>
-            </a:r>
-            <a:r>
-              <a:rPr lang="en-US" altLang="zh-CN" dirty="0"/>
-              <a:t> </a:t>
-            </a:r>
-            <a:r>
-              <a:rPr lang="en-US" altLang="zh-CN" dirty="0" err="1"/>
-              <a:t>insertado</a:t>
-            </a:r>
-            <a:r>
-              <a:rPr lang="en-US" altLang="zh-CN" dirty="0"/>
-              <a:t> </a:t>
-            </a:r>
-            <a:r>
-              <a:rPr lang="en-US" altLang="zh-CN" dirty="0" err="1"/>
-              <a:t>en</a:t>
-            </a:r>
-            <a:r>
-              <a:rPr lang="en-US" altLang="zh-CN" dirty="0"/>
-              <a:t> </a:t>
-            </a:r>
-            <a:r>
-              <a:rPr lang="en-US" altLang="zh-CN" dirty="0" err="1"/>
-              <a:t>el</a:t>
-            </a:r>
-            <a:r>
-              <a:rPr lang="en-US" altLang="zh-CN" dirty="0"/>
-              <a:t> </a:t>
-            </a:r>
-            <a:r>
-              <a:rPr lang="en-US" altLang="zh-CN" dirty="0" err="1"/>
-              <a:t>fichero</a:t>
-            </a:r>
-            <a:r>
-              <a:rPr lang="en-US" altLang="zh-CN" dirty="0"/>
-              <a:t> </a:t>
-            </a:r>
-            <a:r>
-              <a:rPr lang="en-US" altLang="zh-CN" dirty="0" err="1"/>
-              <a:t>comp.ts</a:t>
-            </a:r>
-            <a:r>
-              <a:rPr lang="en-US" altLang="zh-CN" dirty="0"/>
-              <a:t> y fichero.html. </a:t>
-            </a:r>
-            <a:r>
-              <a:rPr lang="en-US" altLang="zh-CN" dirty="0" err="1"/>
-              <a:t>Adem</a:t>
-            </a:r>
-            <a:r>
-              <a:rPr lang="es-ES" altLang="zh-CN" dirty="0" err="1"/>
-              <a:t>ás</a:t>
-            </a:r>
-            <a:r>
-              <a:rPr lang="es-ES" altLang="zh-CN" dirty="0"/>
-              <a:t> los </a:t>
-            </a:r>
-            <a:r>
-              <a:rPr lang="es-ES" altLang="zh-CN" dirty="0" err="1"/>
-              <a:t>comps</a:t>
-            </a:r>
-            <a:r>
-              <a:rPr lang="es-ES" altLang="zh-CN" dirty="0"/>
-              <a:t> se pueden reutilizar en las páginas como </a:t>
-            </a:r>
-            <a:r>
-              <a:rPr lang="es-ES" altLang="zh-CN" dirty="0" err="1"/>
-              <a:t>DOMs</a:t>
-            </a:r>
-            <a:r>
-              <a:rPr lang="es-ES" altLang="zh-CN" dirty="0"/>
-              <a:t>.</a:t>
-            </a:r>
-            <a:endParaRPr lang="en-US" altLang="zh-CN" dirty="0"/>
-          </a:p>
-          <a:p>
-            <a:endParaRPr lang="en-US" altLang="zh-CN" dirty="0"/>
-          </a:p>
-          <a:p>
-            <a:r>
-              <a:rPr lang="en-US" altLang="zh-CN" b="1" dirty="0"/>
-              <a:t>Page</a:t>
-            </a:r>
-            <a:r>
-              <a:rPr lang="en-US" altLang="zh-CN" dirty="0"/>
-              <a:t>: es </a:t>
-            </a:r>
-            <a:r>
-              <a:rPr lang="en-US" altLang="zh-CN" dirty="0" err="1"/>
-              <a:t>como</a:t>
-            </a:r>
-            <a:r>
-              <a:rPr lang="en-US" altLang="zh-CN" dirty="0"/>
-              <a:t> Comp </a:t>
-            </a:r>
-            <a:r>
-              <a:rPr lang="en-US" altLang="zh-CN" dirty="0" err="1"/>
-              <a:t>pero</a:t>
-            </a:r>
-            <a:r>
-              <a:rPr lang="en-US" altLang="zh-CN" dirty="0"/>
-              <a:t> no es </a:t>
-            </a:r>
-            <a:r>
-              <a:rPr lang="en-US" altLang="zh-CN" dirty="0" err="1"/>
-              <a:t>reutilizable</a:t>
-            </a:r>
-            <a:r>
-              <a:rPr lang="en-US" altLang="zh-CN" dirty="0"/>
-              <a:t> </a:t>
-            </a:r>
-            <a:r>
-              <a:rPr lang="en-US" altLang="zh-CN" dirty="0" err="1"/>
-              <a:t>en</a:t>
-            </a:r>
-            <a:r>
-              <a:rPr lang="en-US" altLang="zh-CN" dirty="0"/>
-              <a:t> DOMs, </a:t>
-            </a:r>
-            <a:r>
-              <a:rPr lang="en-US" altLang="zh-CN" dirty="0" err="1"/>
-              <a:t>ni</a:t>
-            </a:r>
-            <a:r>
-              <a:rPr lang="en-US" altLang="zh-CN" dirty="0"/>
-              <a:t> COMPs </a:t>
-            </a:r>
-            <a:r>
-              <a:rPr lang="en-US" altLang="zh-CN" dirty="0" err="1"/>
-              <a:t>ni</a:t>
-            </a:r>
-            <a:r>
-              <a:rPr lang="en-US" altLang="zh-CN" dirty="0"/>
-              <a:t> Pages.</a:t>
-            </a:r>
-          </a:p>
-        </p:txBody>
-      </p:sp>
-    </p:spTree>
-    <p:extLst>
-      <p:ext uri="{BB962C8B-B14F-4D97-AF65-F5344CB8AC3E}">
-        <p14:creationId xmlns:p14="http://schemas.microsoft.com/office/powerpoint/2010/main" val="3884676035"/>
-      </p:ext>
-    </p:extLst>
-  </p:cSld>
-  <p:clrMapOvr>
-    <a:masterClrMapping/>
-  </p:clrMapOvr>
-</p:sld>
-</file>
-
 <file path=ppt/slides/slide3.xml><?xml version="1.0" encoding="utf-8"?>
 <p:sld xmlns:a="http://schemas.openxmlformats.org/drawingml/2006/main" xmlns:r="http://schemas.openxmlformats.org/officeDocument/2006/relationships" xmlns:p="http://schemas.openxmlformats.org/presentationml/2006/main">
   <p:cSld>
@@ -5520,8 +5919,12 @@
           <a:lstStyle/>
           <a:p>
             <a:r>
+              <a:rPr lang="en-US" altLang="zh-CN" dirty="0"/>
+              <a:t>El </a:t>
+            </a:r>
+            <a:r>
               <a:rPr lang="en-US" altLang="zh-CN" dirty="0" err="1"/>
-              <a:t>Metamodelo</a:t>
+              <a:t>metamodelo</a:t>
             </a:r>
             <a:r>
               <a:rPr lang="en-US" altLang="zh-CN" dirty="0"/>
@@ -5708,8 +6111,8 @@
         </p:blipFill>
         <p:spPr>
           <a:xfrm>
-            <a:off x="2790333" y="1507937"/>
-            <a:ext cx="7032980" cy="5350063"/>
+            <a:off x="2812486" y="1283907"/>
+            <a:ext cx="6567027" cy="4995608"/>
           </a:xfrm>
         </p:spPr>
       </p:pic>

</xml_diff>

<commit_message>
Fix no found error "angular runner cmd"
</commit_message>
<xml_diff>
--- a/planning-and-logs/T2A-v0.002.pptx
+++ b/planning-and-logs/T2A-v0.002.pptx
@@ -272,7 +272,7 @@
           <a:p>
             <a:fld id="{194A7CD5-1EE3-4747-97A3-E1E3716A41A1}" type="datetimeFigureOut">
               <a:rPr lang="zh-CN" altLang="en-US" smtClean="0"/>
-              <a:t>2023/3/27</a:t>
+              <a:t>2023/4/25</a:t>
             </a:fld>
             <a:endParaRPr lang="zh-CN" altLang="en-US"/>
           </a:p>
@@ -686,7 +686,7 @@
           <a:p>
             <a:fld id="{BB281D37-F1C1-421D-B41B-B00CEF0412D1}" type="datetimeFigureOut">
               <a:rPr lang="zh-CN" altLang="en-US" smtClean="0"/>
-              <a:t>2023/3/27</a:t>
+              <a:t>2023/4/25</a:t>
             </a:fld>
             <a:endParaRPr lang="zh-CN" altLang="en-US"/>
           </a:p>
@@ -884,7 +884,7 @@
           <a:p>
             <a:fld id="{BB281D37-F1C1-421D-B41B-B00CEF0412D1}" type="datetimeFigureOut">
               <a:rPr lang="zh-CN" altLang="en-US" smtClean="0"/>
-              <a:t>2023/3/27</a:t>
+              <a:t>2023/4/25</a:t>
             </a:fld>
             <a:endParaRPr lang="zh-CN" altLang="en-US"/>
           </a:p>
@@ -1092,7 +1092,7 @@
           <a:p>
             <a:fld id="{BB281D37-F1C1-421D-B41B-B00CEF0412D1}" type="datetimeFigureOut">
               <a:rPr lang="zh-CN" altLang="en-US" smtClean="0"/>
-              <a:t>2023/3/27</a:t>
+              <a:t>2023/4/25</a:t>
             </a:fld>
             <a:endParaRPr lang="zh-CN" altLang="en-US"/>
           </a:p>
@@ -1290,7 +1290,7 @@
           <a:p>
             <a:fld id="{BB281D37-F1C1-421D-B41B-B00CEF0412D1}" type="datetimeFigureOut">
               <a:rPr lang="zh-CN" altLang="en-US" smtClean="0"/>
-              <a:t>2023/3/27</a:t>
+              <a:t>2023/4/25</a:t>
             </a:fld>
             <a:endParaRPr lang="zh-CN" altLang="en-US"/>
           </a:p>
@@ -1565,7 +1565,7 @@
           <a:p>
             <a:fld id="{BB281D37-F1C1-421D-B41B-B00CEF0412D1}" type="datetimeFigureOut">
               <a:rPr lang="zh-CN" altLang="en-US" smtClean="0"/>
-              <a:t>2023/3/27</a:t>
+              <a:t>2023/4/25</a:t>
             </a:fld>
             <a:endParaRPr lang="zh-CN" altLang="en-US"/>
           </a:p>
@@ -1830,7 +1830,7 @@
           <a:p>
             <a:fld id="{BB281D37-F1C1-421D-B41B-B00CEF0412D1}" type="datetimeFigureOut">
               <a:rPr lang="zh-CN" altLang="en-US" smtClean="0"/>
-              <a:t>2023/3/27</a:t>
+              <a:t>2023/4/25</a:t>
             </a:fld>
             <a:endParaRPr lang="zh-CN" altLang="en-US"/>
           </a:p>
@@ -2242,7 +2242,7 @@
           <a:p>
             <a:fld id="{BB281D37-F1C1-421D-B41B-B00CEF0412D1}" type="datetimeFigureOut">
               <a:rPr lang="zh-CN" altLang="en-US" smtClean="0"/>
-              <a:t>2023/3/27</a:t>
+              <a:t>2023/4/25</a:t>
             </a:fld>
             <a:endParaRPr lang="zh-CN" altLang="en-US"/>
           </a:p>
@@ -2383,7 +2383,7 @@
           <a:p>
             <a:fld id="{BB281D37-F1C1-421D-B41B-B00CEF0412D1}" type="datetimeFigureOut">
               <a:rPr lang="zh-CN" altLang="en-US" smtClean="0"/>
-              <a:t>2023/3/27</a:t>
+              <a:t>2023/4/25</a:t>
             </a:fld>
             <a:endParaRPr lang="zh-CN" altLang="en-US"/>
           </a:p>
@@ -2496,7 +2496,7 @@
           <a:p>
             <a:fld id="{BB281D37-F1C1-421D-B41B-B00CEF0412D1}" type="datetimeFigureOut">
               <a:rPr lang="zh-CN" altLang="en-US" smtClean="0"/>
-              <a:t>2023/3/27</a:t>
+              <a:t>2023/4/25</a:t>
             </a:fld>
             <a:endParaRPr lang="zh-CN" altLang="en-US"/>
           </a:p>
@@ -2807,7 +2807,7 @@
           <a:p>
             <a:fld id="{BB281D37-F1C1-421D-B41B-B00CEF0412D1}" type="datetimeFigureOut">
               <a:rPr lang="zh-CN" altLang="en-US" smtClean="0"/>
-              <a:t>2023/3/27</a:t>
+              <a:t>2023/4/25</a:t>
             </a:fld>
             <a:endParaRPr lang="zh-CN" altLang="en-US"/>
           </a:p>
@@ -3095,7 +3095,7 @@
           <a:p>
             <a:fld id="{BB281D37-F1C1-421D-B41B-B00CEF0412D1}" type="datetimeFigureOut">
               <a:rPr lang="zh-CN" altLang="en-US" smtClean="0"/>
-              <a:t>2023/3/27</a:t>
+              <a:t>2023/4/25</a:t>
             </a:fld>
             <a:endParaRPr lang="zh-CN" altLang="en-US"/>
           </a:p>
@@ -3336,7 +3336,7 @@
           <a:p>
             <a:fld id="{BB281D37-F1C1-421D-B41B-B00CEF0412D1}" type="datetimeFigureOut">
               <a:rPr lang="zh-CN" altLang="en-US" smtClean="0"/>
-              <a:t>2023/3/27</a:t>
+              <a:t>2023/4/25</a:t>
             </a:fld>
             <a:endParaRPr lang="zh-CN" altLang="en-US"/>
           </a:p>

</xml_diff>

<commit_message>
Add override to terminal STRING
</commit_message>
<xml_diff>
--- a/planning-and-logs/T2A-v0.002.pptx
+++ b/planning-and-logs/T2A-v0.002.pptx
@@ -3880,7 +3880,11 @@
           <a:p>
             <a:r>
               <a:rPr lang="es-ES" altLang="zh-CN" dirty="0"/>
-              <a:t>Resultado esperado en funcionamiento del proyecto Angular</a:t>
+              <a:t>Resultado esperado al ejecutar el proyecto Angular </a:t>
+            </a:r>
+            <a:r>
+              <a:rPr lang="es-ES" altLang="zh-CN"/>
+              <a:t>que será generado</a:t>
             </a:r>
             <a:endParaRPr lang="zh-CN" altLang="en-US" dirty="0"/>
           </a:p>

</xml_diff>